<commit_message>
remove some obsolete stuff
</commit_message>
<xml_diff>
--- a/Wormhole.pptx
+++ b/Wormhole.pptx
@@ -3840,7 +3840,16 @@
             <a:pPr lvl="1"/>
             <a:r>
               <a:rPr lang="en-US" dirty="0"/>
-              <a:t>Security is can be implemented at the Resolver level or the REST API </a:t>
+              <a:t>Security is can be implemented at the Resolver level or the REST API</a:t>
+            </a:r>
+          </a:p>
+          <a:p>
+            <a:pPr marL="457200" lvl="1" indent="0">
+              <a:buNone/>
+            </a:pPr>
+            <a:r>
+              <a:rPr lang="en-US" dirty="0"/>
+              <a:t> </a:t>
             </a:r>
           </a:p>
           <a:p>
@@ -3944,6 +3953,18 @@
             <a:r>
               <a:rPr lang="en-US" dirty="0"/>
               <a:t> (When? When did it go public?)</a:t>
+            </a:r>
+          </a:p>
+          <a:p>
+            <a:r>
+              <a:rPr lang="en-US" dirty="0"/>
+              <a:t>What is a Query Alias and when do I need one?</a:t>
+            </a:r>
+          </a:p>
+          <a:p>
+            <a:r>
+              <a:rPr lang="en-US" dirty="0"/>
+              <a:t>What is a fragment?</a:t>
             </a:r>
           </a:p>
           <a:p>
@@ -4901,13 +4922,8 @@
             </a:r>
             <a:r>
               <a:rPr lang="en-US" dirty="0"/>
-              <a:t> interface to IDS, DMPS</a:t>
-            </a:r>
-            <a:r>
-              <a:rPr lang="en-US"/>
-              <a:t>, Reporting DB</a:t>
-            </a:r>
-            <a:endParaRPr lang="en-US" dirty="0"/>
+              <a:t> interface to IDS, DMPS, Reporting DB</a:t>
+            </a:r>
           </a:p>
           <a:p>
             <a:endParaRPr lang="en-US" dirty="0"/>
@@ -5501,10 +5517,9 @@
             </a:r>
           </a:p>
           <a:p>
-            <a:pPr lvl="1"/>
-            <a:r>
-              <a:rPr lang="en-US" dirty="0"/>
-              <a:t>Named queries for collisions </a:t>
+            <a:r>
+              <a:rPr lang="en-US" dirty="0"/>
+              <a:t>Aliases</a:t>
             </a:r>
           </a:p>
           <a:p>

</xml_diff>

<commit_message>
couple last minute fixes
</commit_message>
<xml_diff>
--- a/Wormhole.pptx
+++ b/Wormhole.pptx
@@ -273,7 +273,7 @@
           <a:p>
             <a:fld id="{0F7DE950-097D-DA41-9F24-20C4FB80A6FA}" type="datetimeFigureOut">
               <a:rPr lang="en-US" smtClean="0"/>
-              <a:t>4/10/19</a:t>
+              <a:t>4/12/19</a:t>
             </a:fld>
             <a:endParaRPr lang="en-US"/>
           </a:p>
@@ -471,7 +471,7 @@
           <a:p>
             <a:fld id="{0F7DE950-097D-DA41-9F24-20C4FB80A6FA}" type="datetimeFigureOut">
               <a:rPr lang="en-US" smtClean="0"/>
-              <a:t>4/10/19</a:t>
+              <a:t>4/12/19</a:t>
             </a:fld>
             <a:endParaRPr lang="en-US"/>
           </a:p>
@@ -679,7 +679,7 @@
           <a:p>
             <a:fld id="{0F7DE950-097D-DA41-9F24-20C4FB80A6FA}" type="datetimeFigureOut">
               <a:rPr lang="en-US" smtClean="0"/>
-              <a:t>4/10/19</a:t>
+              <a:t>4/12/19</a:t>
             </a:fld>
             <a:endParaRPr lang="en-US"/>
           </a:p>
@@ -877,7 +877,7 @@
           <a:p>
             <a:fld id="{0F7DE950-097D-DA41-9F24-20C4FB80A6FA}" type="datetimeFigureOut">
               <a:rPr lang="en-US" smtClean="0"/>
-              <a:t>4/10/19</a:t>
+              <a:t>4/12/19</a:t>
             </a:fld>
             <a:endParaRPr lang="en-US"/>
           </a:p>
@@ -1152,7 +1152,7 @@
           <a:p>
             <a:fld id="{0F7DE950-097D-DA41-9F24-20C4FB80A6FA}" type="datetimeFigureOut">
               <a:rPr lang="en-US" smtClean="0"/>
-              <a:t>4/10/19</a:t>
+              <a:t>4/12/19</a:t>
             </a:fld>
             <a:endParaRPr lang="en-US"/>
           </a:p>
@@ -1417,7 +1417,7 @@
           <a:p>
             <a:fld id="{0F7DE950-097D-DA41-9F24-20C4FB80A6FA}" type="datetimeFigureOut">
               <a:rPr lang="en-US" smtClean="0"/>
-              <a:t>4/10/19</a:t>
+              <a:t>4/12/19</a:t>
             </a:fld>
             <a:endParaRPr lang="en-US"/>
           </a:p>
@@ -1829,7 +1829,7 @@
           <a:p>
             <a:fld id="{0F7DE950-097D-DA41-9F24-20C4FB80A6FA}" type="datetimeFigureOut">
               <a:rPr lang="en-US" smtClean="0"/>
-              <a:t>4/10/19</a:t>
+              <a:t>4/12/19</a:t>
             </a:fld>
             <a:endParaRPr lang="en-US"/>
           </a:p>
@@ -1970,7 +1970,7 @@
           <a:p>
             <a:fld id="{0F7DE950-097D-DA41-9F24-20C4FB80A6FA}" type="datetimeFigureOut">
               <a:rPr lang="en-US" smtClean="0"/>
-              <a:t>4/10/19</a:t>
+              <a:t>4/12/19</a:t>
             </a:fld>
             <a:endParaRPr lang="en-US"/>
           </a:p>
@@ -2083,7 +2083,7 @@
           <a:p>
             <a:fld id="{0F7DE950-097D-DA41-9F24-20C4FB80A6FA}" type="datetimeFigureOut">
               <a:rPr lang="en-US" smtClean="0"/>
-              <a:t>4/10/19</a:t>
+              <a:t>4/12/19</a:t>
             </a:fld>
             <a:endParaRPr lang="en-US"/>
           </a:p>
@@ -2394,7 +2394,7 @@
           <a:p>
             <a:fld id="{0F7DE950-097D-DA41-9F24-20C4FB80A6FA}" type="datetimeFigureOut">
               <a:rPr lang="en-US" smtClean="0"/>
-              <a:t>4/10/19</a:t>
+              <a:t>4/12/19</a:t>
             </a:fld>
             <a:endParaRPr lang="en-US"/>
           </a:p>
@@ -2682,7 +2682,7 @@
           <a:p>
             <a:fld id="{0F7DE950-097D-DA41-9F24-20C4FB80A6FA}" type="datetimeFigureOut">
               <a:rPr lang="en-US" smtClean="0"/>
-              <a:t>4/10/19</a:t>
+              <a:t>4/12/19</a:t>
             </a:fld>
             <a:endParaRPr lang="en-US"/>
           </a:p>
@@ -2923,7 +2923,7 @@
           <a:p>
             <a:fld id="{0F7DE950-097D-DA41-9F24-20C4FB80A6FA}" type="datetimeFigureOut">
               <a:rPr lang="en-US" smtClean="0"/>
-              <a:t>4/10/19</a:t>
+              <a:t>4/12/19</a:t>
             </a:fld>
             <a:endParaRPr lang="en-US"/>
           </a:p>
@@ -4220,7 +4220,12 @@
             <p:ph idx="1"/>
           </p:nvPr>
         </p:nvSpPr>
-        <p:spPr/>
+        <p:spPr>
+          <a:xfrm>
+            <a:off x="838200" y="1837500"/>
+            <a:ext cx="10515600" cy="4351338"/>
+          </a:xfrm>
+        </p:spPr>
         <p:txBody>
           <a:bodyPr/>
           <a:lstStyle/>
@@ -4269,21 +4274,13 @@
           <a:p>
             <a:r>
               <a:rPr lang="en-US" dirty="0"/>
+              <a:t>Bonus: what are some disadvantages?</a:t>
+            </a:r>
+          </a:p>
+          <a:p>
+            <a:r>
+              <a:rPr lang="en-US" dirty="0"/>
               <a:t>What is a Query Alias and when do I need one?</a:t>
-            </a:r>
-          </a:p>
-          <a:p>
-            <a:r>
-              <a:rPr lang="en-US" dirty="0"/>
-              <a:t>What is </a:t>
-            </a:r>
-            <a:r>
-              <a:rPr lang="en-US"/>
-              <a:t>a F\ragment</a:t>
-            </a:r>
-            <a:r>
-              <a:rPr lang="en-US" dirty="0"/>
-              <a:t>?</a:t>
             </a:r>
           </a:p>
           <a:p>

</xml_diff>

<commit_message>
update to ppt, delete readme
</commit_message>
<xml_diff>
--- a/Wormhole.pptx
+++ b/Wormhole.pptx
@@ -4385,6 +4385,23 @@
               <a:rPr lang="en-US" dirty="0">
                 <a:hlinkClick r:id="rId2"/>
               </a:rPr>
+              <a:t>https://github.com/hmhco/data-framework/tree/develop/wormhole-</a:t>
+            </a:r>
+            <a:r>
+              <a:rPr lang="en-US">
+                <a:hlinkClick r:id="rId2"/>
+              </a:rPr>
+              <a:t>api</a:t>
+            </a:r>
+            <a:endParaRPr lang="en-US" dirty="0">
+              <a:hlinkClick r:id="rId2"/>
+            </a:endParaRPr>
+          </a:p>
+          <a:p>
+            <a:r>
+              <a:rPr lang="en-US" dirty="0">
+                <a:hlinkClick r:id="rId2"/>
+              </a:rPr>
               <a:t>https://graphql.github.io/graphql-spec/</a:t>
             </a:r>
             <a:endParaRPr lang="en-US" dirty="0"/>
@@ -4420,13 +4437,15 @@
             </a:r>
           </a:p>
           <a:p>
-            <a:pPr lvl="1"/>
             <a:r>
               <a:rPr lang="en-US" dirty="0">
                 <a:hlinkClick r:id="rId6"/>
               </a:rPr>
               <a:t>https://data.boston.gov/dataset/food-establishment-inspections/resource/4582bec6-2b4f-4f9e-bc55-cbaa73117f4c</a:t>
             </a:r>
+            <a:endParaRPr lang="en-US" dirty="0"/>
+          </a:p>
+          <a:p>
             <a:endParaRPr lang="en-US" dirty="0"/>
           </a:p>
         </p:txBody>

</xml_diff>